<commit_message>
Correcciones previas a respuesta de Victor del correo
</commit_message>
<xml_diff>
--- a/presentación_final.pptx
+++ b/presentación_final.pptx
@@ -388,7 +388,7 @@
           <a:p>
             <a:fld id="{ED291B17-9318-49DB-B28B-6E5994AE9581}" type="datetime1">
               <a:rPr lang="en-US" smtClean="0"/>
-              <a:t>5/17/20</a:t>
+              <a:t>5/17/2020</a:t>
             </a:fld>
             <a:endParaRPr lang="en-US"/>
           </a:p>
@@ -589,7 +589,7 @@
           <a:p>
             <a:fld id="{2CED4963-E985-44C4-B8C4-FDD613B7C2F8}" type="datetime1">
               <a:rPr lang="en-US" smtClean="0"/>
-              <a:t>5/17/20</a:t>
+              <a:t>5/17/2020</a:t>
             </a:fld>
             <a:endParaRPr lang="en-US"/>
           </a:p>
@@ -949,7 +949,7 @@
           <a:p>
             <a:fld id="{ED291B17-9318-49DB-B28B-6E5994AE9581}" type="datetime1">
               <a:rPr lang="en-US" smtClean="0"/>
-              <a:t>5/17/20</a:t>
+              <a:t>5/17/2020</a:t>
             </a:fld>
             <a:endParaRPr lang="en-US"/>
           </a:p>
@@ -1145,7 +1145,7 @@
           <a:p>
             <a:fld id="{78DD82B9-B8EE-4375-B6FF-88FA6ABB15D9}" type="datetime1">
               <a:rPr lang="en-US" smtClean="0"/>
-              <a:t>5/17/20</a:t>
+              <a:t>5/17/2020</a:t>
             </a:fld>
             <a:endParaRPr lang="en-US"/>
           </a:p>
@@ -1456,7 +1456,7 @@
           <a:p>
             <a:fld id="{B2497495-0637-405E-AE64-5CC7506D51F5}" type="datetime1">
               <a:rPr lang="en-US" smtClean="0"/>
-              <a:t>5/17/20</a:t>
+              <a:t>5/17/2020</a:t>
             </a:fld>
             <a:endParaRPr lang="en-US"/>
           </a:p>
@@ -1706,7 +1706,7 @@
           <a:p>
             <a:fld id="{7BFFD690-9426-415D-8B65-26881E07B2D4}" type="datetime1">
               <a:rPr lang="en-US" smtClean="0"/>
-              <a:t>5/17/20</a:t>
+              <a:t>5/17/2020</a:t>
             </a:fld>
             <a:endParaRPr lang="en-US"/>
           </a:p>
@@ -2125,7 +2125,7 @@
           <a:p>
             <a:fld id="{04C4989A-474C-40DE-95B9-011C28B71673}" type="datetime1">
               <a:rPr lang="en-US" smtClean="0"/>
-              <a:t>5/17/20</a:t>
+              <a:t>5/17/2020</a:t>
             </a:fld>
             <a:endParaRPr lang="en-US"/>
           </a:p>
@@ -2247,7 +2247,7 @@
           <a:p>
             <a:fld id="{5DB4ED54-5B5E-4A04-93D3-5772E3CE3818}" type="datetime1">
               <a:rPr lang="en-US" smtClean="0"/>
-              <a:t>5/17/20</a:t>
+              <a:t>5/17/2020</a:t>
             </a:fld>
             <a:endParaRPr lang="en-US"/>
           </a:p>
@@ -2342,7 +2342,7 @@
           <a:p>
             <a:fld id="{4EDE50D6-574B-40AF-946F-D52A04ADE379}" type="datetime1">
               <a:rPr lang="en-US" smtClean="0"/>
-              <a:t>5/17/20</a:t>
+              <a:t>5/17/2020</a:t>
             </a:fld>
             <a:endParaRPr lang="en-US"/>
           </a:p>
@@ -2717,7 +2717,7 @@
           <a:p>
             <a:fld id="{D82884F1-FFEA-405F-9602-3DCA865EDA4E}" type="datetime1">
               <a:rPr lang="en-US" smtClean="0"/>
-              <a:t>5/17/20</a:t>
+              <a:t>5/17/2020</a:t>
             </a:fld>
             <a:endParaRPr lang="en-US"/>
           </a:p>
@@ -3008,7 +3008,7 @@
           <a:p>
             <a:fld id="{7E18DB4A-8810-4A10-AD5C-D5E2C667F5B3}" type="datetime1">
               <a:rPr lang="en-US" smtClean="0"/>
-              <a:t>5/17/20</a:t>
+              <a:t>5/17/2020</a:t>
             </a:fld>
             <a:endParaRPr lang="en-US"/>
           </a:p>
@@ -3221,7 +3221,7 @@
           <a:p>
             <a:fld id="{ED291B17-9318-49DB-B28B-6E5994AE9581}" type="datetime1">
               <a:rPr lang="en-US" smtClean="0"/>
-              <a:t>5/17/20</a:t>
+              <a:t>5/17/2020</a:t>
             </a:fld>
             <a:endParaRPr lang="en-US"/>
           </a:p>
@@ -3869,7 +3869,7 @@
                 <a16:creationId xmlns:a16="http://schemas.microsoft.com/office/drawing/2014/main" id="{587D26DA-9773-4A0E-B213-DDF20A1F1F27}"/>
               </a:ext>
               <a:ext uri="{C183D7F6-B498-43B3-948B-1728B52AA6E4}">
-                <adec:decorative xmlns:adec="http://schemas.microsoft.com/office/drawing/2017/decorative" val="1"/>
+                <adec:decorative xmlns:adec="http://schemas.microsoft.com/office/drawing/2017/decorative" xmlns="" val="1"/>
               </a:ext>
             </a:extLst>
           </p:cNvPr>
@@ -5113,31 +5113,31 @@
           <a:lstStyle/>
           <a:p>
             <a:r>
-              <a:rPr lang="en-US"/>
+              <a:rPr lang="en-US" dirty="0"/>
               <a:t>Con </a:t>
             </a:r>
             <a:r>
-              <a:rPr lang="en-US" err="1"/>
+              <a:rPr lang="en-US" dirty="0" err="1"/>
               <a:t>correción</a:t>
             </a:r>
             <a:r>
-              <a:rPr lang="en-US"/>
+              <a:rPr lang="en-US" dirty="0"/>
               <a:t> de </a:t>
             </a:r>
             <a:r>
-              <a:rPr lang="en-US" err="1"/>
+              <a:rPr lang="en-US" dirty="0" err="1"/>
               <a:t>datos</a:t>
             </a:r>
             <a:r>
-              <a:rPr lang="en-US"/>
+              <a:rPr lang="en-US" dirty="0"/>
               <a:t> </a:t>
             </a:r>
             <a:r>
-              <a:rPr lang="en-US" err="1"/>
+              <a:rPr lang="en-US" dirty="0" err="1"/>
               <a:t>atípicos</a:t>
             </a:r>
             <a:r>
-              <a:rPr lang="en-US"/>
+              <a:rPr lang="en-US" dirty="0"/>
               <a:t>.</a:t>
             </a:r>
           </a:p>
@@ -5175,23 +5175,23 @@
           <a:lstStyle/>
           <a:p>
             <a:r>
-              <a:rPr lang="en-US"/>
+              <a:rPr lang="en-US" dirty="0"/>
               <a:t>Con </a:t>
             </a:r>
             <a:r>
-              <a:rPr lang="en-US" err="1"/>
+              <a:rPr lang="en-US" dirty="0" err="1"/>
               <a:t>transformación</a:t>
             </a:r>
             <a:r>
-              <a:rPr lang="en-US"/>
+              <a:rPr lang="en-US" dirty="0"/>
               <a:t> </a:t>
             </a:r>
             <a:r>
-              <a:rPr lang="en-US" err="1"/>
+              <a:rPr lang="en-US" dirty="0" err="1"/>
               <a:t>potencia</a:t>
             </a:r>
             <a:r>
-              <a:rPr lang="en-US"/>
+              <a:rPr lang="en-US" dirty="0"/>
               <a:t>.</a:t>
             </a:r>
           </a:p>
@@ -5374,7 +5374,7 @@
                 <a16:creationId xmlns:a16="http://schemas.microsoft.com/office/drawing/2014/main" id="{910015B9-6046-41B8-83BD-71778D2F9798}"/>
               </a:ext>
               <a:ext uri="{C183D7F6-B498-43B3-948B-1728B52AA6E4}">
-                <adec:decorative xmlns:adec="http://schemas.microsoft.com/office/drawing/2017/decorative" val="1"/>
+                <adec:decorative xmlns:adec="http://schemas.microsoft.com/office/drawing/2017/decorative" xmlns="" val="1"/>
               </a:ext>
             </a:extLst>
           </p:cNvPr>
@@ -5428,7 +5428,7 @@
                 <a16:creationId xmlns:a16="http://schemas.microsoft.com/office/drawing/2014/main" id="{53908232-52E2-4794-A6C1-54300FB98919}"/>
               </a:ext>
               <a:ext uri="{C183D7F6-B498-43B3-948B-1728B52AA6E4}">
-                <adec:decorative xmlns:adec="http://schemas.microsoft.com/office/drawing/2017/decorative" val="1"/>
+                <adec:decorative xmlns:adec="http://schemas.microsoft.com/office/drawing/2017/decorative" xmlns="" val="1"/>
               </a:ext>
             </a:extLst>
           </p:cNvPr>
@@ -5482,7 +5482,7 @@
                 <a16:creationId xmlns:a16="http://schemas.microsoft.com/office/drawing/2014/main" id="{D2B9299F-BED7-44C5-9CC5-E542F9193C2F}"/>
               </a:ext>
               <a:ext uri="{C183D7F6-B498-43B3-948B-1728B52AA6E4}">
-                <adec:decorative xmlns:adec="http://schemas.microsoft.com/office/drawing/2017/decorative" val="1"/>
+                <adec:decorative xmlns:adec="http://schemas.microsoft.com/office/drawing/2017/decorative" xmlns="" val="1"/>
               </a:ext>
             </a:extLst>
           </p:cNvPr>
@@ -5536,7 +5536,7 @@
                 <a16:creationId xmlns:a16="http://schemas.microsoft.com/office/drawing/2014/main" id="{7B34D440-E359-4CB9-B8E8-81977A860306}"/>
               </a:ext>
               <a:ext uri="{C183D7F6-B498-43B3-948B-1728B52AA6E4}">
-                <adec:decorative xmlns:adec="http://schemas.microsoft.com/office/drawing/2017/decorative" val="1"/>
+                <adec:decorative xmlns:adec="http://schemas.microsoft.com/office/drawing/2017/decorative" xmlns="" val="1"/>
               </a:ext>
             </a:extLst>
           </p:cNvPr>
@@ -5657,7 +5657,7 @@
                 <a16:creationId xmlns:a16="http://schemas.microsoft.com/office/drawing/2014/main" id="{D288FC14-B788-4FBC-9C5E-BC4892F579B0}"/>
               </a:ext>
               <a:ext uri="{C183D7F6-B498-43B3-948B-1728B52AA6E4}">
-                <adec:decorative xmlns:adec="http://schemas.microsoft.com/office/drawing/2017/decorative" val="1"/>
+                <adec:decorative xmlns:adec="http://schemas.microsoft.com/office/drawing/2017/decorative" xmlns="" val="1"/>
               </a:ext>
             </a:extLst>
           </p:cNvPr>
@@ -6511,7 +6511,7 @@
                 <a16:creationId xmlns:a16="http://schemas.microsoft.com/office/drawing/2014/main" id="{DCF4EB5C-ED25-4675-8255-2F5B12CFFCF0}"/>
               </a:ext>
               <a:ext uri="{C183D7F6-B498-43B3-948B-1728B52AA6E4}">
-                <adec:decorative xmlns:adec="http://schemas.microsoft.com/office/drawing/2017/decorative" val="1"/>
+                <adec:decorative xmlns:adec="http://schemas.microsoft.com/office/drawing/2017/decorative" xmlns="" val="1"/>
               </a:ext>
             </a:extLst>
           </p:cNvPr>
@@ -6565,7 +6565,7 @@
                 <a16:creationId xmlns:a16="http://schemas.microsoft.com/office/drawing/2014/main" id="{9514EC6E-A557-42A2-BCDC-3ABFFC5E564D}"/>
               </a:ext>
               <a:ext uri="{C183D7F6-B498-43B3-948B-1728B52AA6E4}">
-                <adec:decorative xmlns:adec="http://schemas.microsoft.com/office/drawing/2017/decorative" val="1"/>
+                <adec:decorative xmlns:adec="http://schemas.microsoft.com/office/drawing/2017/decorative" xmlns="" val="1"/>
               </a:ext>
             </a:extLst>
           </p:cNvPr>
@@ -6619,7 +6619,7 @@
                 <a16:creationId xmlns:a16="http://schemas.microsoft.com/office/drawing/2014/main" id="{905482C9-EB42-4BFE-95BF-7FD661F07657}"/>
               </a:ext>
               <a:ext uri="{C183D7F6-B498-43B3-948B-1728B52AA6E4}">
-                <adec:decorative xmlns:adec="http://schemas.microsoft.com/office/drawing/2017/decorative" val="1"/>
+                <adec:decorative xmlns:adec="http://schemas.microsoft.com/office/drawing/2017/decorative" xmlns="" val="1"/>
               </a:ext>
             </a:extLst>
           </p:cNvPr>
@@ -6673,7 +6673,7 @@
                 <a16:creationId xmlns:a16="http://schemas.microsoft.com/office/drawing/2014/main" id="{F858DF7D-C2D0-4B03-A7A0-2F06B789EE35}"/>
               </a:ext>
               <a:ext uri="{C183D7F6-B498-43B3-948B-1728B52AA6E4}">
-                <adec:decorative xmlns:adec="http://schemas.microsoft.com/office/drawing/2017/decorative" val="1"/>
+                <adec:decorative xmlns:adec="http://schemas.microsoft.com/office/drawing/2017/decorative" xmlns="" val="1"/>
               </a:ext>
             </a:extLst>
           </p:cNvPr>
@@ -6733,7 +6733,7 @@
                 <a16:creationId xmlns:a16="http://schemas.microsoft.com/office/drawing/2014/main" id="{1B26B711-3121-40B0-8377-A64F3DC00C7A}"/>
               </a:ext>
               <a:ext uri="{C183D7F6-B498-43B3-948B-1728B52AA6E4}">
-                <adec:decorative xmlns:adec="http://schemas.microsoft.com/office/drawing/2017/decorative" val="1"/>
+                <adec:decorative xmlns:adec="http://schemas.microsoft.com/office/drawing/2017/decorative" xmlns="" val="1"/>
               </a:ext>
             </a:extLst>
           </p:cNvPr>
@@ -6787,7 +6787,7 @@
                 <a16:creationId xmlns:a16="http://schemas.microsoft.com/office/drawing/2014/main" id="{645C4D3D-ABBA-4B4E-93E5-01E343719849}"/>
               </a:ext>
               <a:ext uri="{C183D7F6-B498-43B3-948B-1728B52AA6E4}">
-                <adec:decorative xmlns:adec="http://schemas.microsoft.com/office/drawing/2017/decorative" val="1"/>
+                <adec:decorative xmlns:adec="http://schemas.microsoft.com/office/drawing/2017/decorative" xmlns="" val="1"/>
               </a:ext>
             </a:extLst>
           </p:cNvPr>
@@ -6841,7 +6841,7 @@
                 <a16:creationId xmlns:a16="http://schemas.microsoft.com/office/drawing/2014/main" id="{98DDD5E5-0097-4C6C-B266-5732EDA96CC4}"/>
               </a:ext>
               <a:ext uri="{C183D7F6-B498-43B3-948B-1728B52AA6E4}">
-                <adec:decorative xmlns:adec="http://schemas.microsoft.com/office/drawing/2017/decorative" val="1"/>
+                <adec:decorative xmlns:adec="http://schemas.microsoft.com/office/drawing/2017/decorative" xmlns="" val="1"/>
               </a:ext>
             </a:extLst>
           </p:cNvPr>
@@ -6895,7 +6895,7 @@
                 <a16:creationId xmlns:a16="http://schemas.microsoft.com/office/drawing/2014/main" id="{8952EF87-C74F-4D3F-9CAD-EEA1733C9BD0}"/>
               </a:ext>
               <a:ext uri="{C183D7F6-B498-43B3-948B-1728B52AA6E4}">
-                <adec:decorative xmlns:adec="http://schemas.microsoft.com/office/drawing/2017/decorative" val="1"/>
+                <adec:decorative xmlns:adec="http://schemas.microsoft.com/office/drawing/2017/decorative" xmlns="" val="1"/>
               </a:ext>
             </a:extLst>
           </p:cNvPr>
@@ -7693,7 +7693,7 @@
                 <a16:creationId xmlns:a16="http://schemas.microsoft.com/office/drawing/2014/main" id="{910015B9-6046-41B8-83BD-71778D2F9798}"/>
               </a:ext>
               <a:ext uri="{C183D7F6-B498-43B3-948B-1728B52AA6E4}">
-                <adec:decorative xmlns:adec="http://schemas.microsoft.com/office/drawing/2017/decorative" val="1"/>
+                <adec:decorative xmlns:adec="http://schemas.microsoft.com/office/drawing/2017/decorative" xmlns="" val="1"/>
               </a:ext>
             </a:extLst>
           </p:cNvPr>
@@ -7747,7 +7747,7 @@
                 <a16:creationId xmlns:a16="http://schemas.microsoft.com/office/drawing/2014/main" id="{53908232-52E2-4794-A6C1-54300FB98919}"/>
               </a:ext>
               <a:ext uri="{C183D7F6-B498-43B3-948B-1728B52AA6E4}">
-                <adec:decorative xmlns:adec="http://schemas.microsoft.com/office/drawing/2017/decorative" val="1"/>
+                <adec:decorative xmlns:adec="http://schemas.microsoft.com/office/drawing/2017/decorative" xmlns="" val="1"/>
               </a:ext>
             </a:extLst>
           </p:cNvPr>
@@ -7801,7 +7801,7 @@
                 <a16:creationId xmlns:a16="http://schemas.microsoft.com/office/drawing/2014/main" id="{D2B9299F-BED7-44C5-9CC5-E542F9193C2F}"/>
               </a:ext>
               <a:ext uri="{C183D7F6-B498-43B3-948B-1728B52AA6E4}">
-                <adec:decorative xmlns:adec="http://schemas.microsoft.com/office/drawing/2017/decorative" val="1"/>
+                <adec:decorative xmlns:adec="http://schemas.microsoft.com/office/drawing/2017/decorative" xmlns="" val="1"/>
               </a:ext>
             </a:extLst>
           </p:cNvPr>
@@ -7855,7 +7855,7 @@
                 <a16:creationId xmlns:a16="http://schemas.microsoft.com/office/drawing/2014/main" id="{504BED40-EAF7-4E55-AFF7-2CD840EBD3AA}"/>
               </a:ext>
               <a:ext uri="{C183D7F6-B498-43B3-948B-1728B52AA6E4}">
-                <adec:decorative xmlns:adec="http://schemas.microsoft.com/office/drawing/2017/decorative" val="1"/>
+                <adec:decorative xmlns:adec="http://schemas.microsoft.com/office/drawing/2017/decorative" xmlns="" val="1"/>
               </a:ext>
             </a:extLst>
           </p:cNvPr>
@@ -7957,7 +7957,7 @@
                 <a16:creationId xmlns:a16="http://schemas.microsoft.com/office/drawing/2014/main" id="{F367CCF1-BB1E-41CF-8499-94A870C33EFA}"/>
               </a:ext>
               <a:ext uri="{C183D7F6-B498-43B3-948B-1728B52AA6E4}">
-                <adec:decorative xmlns:adec="http://schemas.microsoft.com/office/drawing/2017/decorative" val="1"/>
+                <adec:decorative xmlns:adec="http://schemas.microsoft.com/office/drawing/2017/decorative" xmlns="" val="1"/>
               </a:ext>
             </a:extLst>
           </p:cNvPr>
@@ -8348,7 +8348,7 @@
                 <a16:creationId xmlns:a16="http://schemas.microsoft.com/office/drawing/2014/main" id="{910015B9-6046-41B8-83BD-71778D2F9798}"/>
               </a:ext>
               <a:ext uri="{C183D7F6-B498-43B3-948B-1728B52AA6E4}">
-                <adec:decorative xmlns:adec="http://schemas.microsoft.com/office/drawing/2017/decorative" val="1"/>
+                <adec:decorative xmlns:adec="http://schemas.microsoft.com/office/drawing/2017/decorative" xmlns="" val="1"/>
               </a:ext>
             </a:extLst>
           </p:cNvPr>
@@ -8402,7 +8402,7 @@
                 <a16:creationId xmlns:a16="http://schemas.microsoft.com/office/drawing/2014/main" id="{53908232-52E2-4794-A6C1-54300FB98919}"/>
               </a:ext>
               <a:ext uri="{C183D7F6-B498-43B3-948B-1728B52AA6E4}">
-                <adec:decorative xmlns:adec="http://schemas.microsoft.com/office/drawing/2017/decorative" val="1"/>
+                <adec:decorative xmlns:adec="http://schemas.microsoft.com/office/drawing/2017/decorative" xmlns="" val="1"/>
               </a:ext>
             </a:extLst>
           </p:cNvPr>
@@ -8456,7 +8456,7 @@
                 <a16:creationId xmlns:a16="http://schemas.microsoft.com/office/drawing/2014/main" id="{D2B9299F-BED7-44C5-9CC5-E542F9193C2F}"/>
               </a:ext>
               <a:ext uri="{C183D7F6-B498-43B3-948B-1728B52AA6E4}">
-                <adec:decorative xmlns:adec="http://schemas.microsoft.com/office/drawing/2017/decorative" val="1"/>
+                <adec:decorative xmlns:adec="http://schemas.microsoft.com/office/drawing/2017/decorative" xmlns="" val="1"/>
               </a:ext>
             </a:extLst>
           </p:cNvPr>
@@ -8510,7 +8510,7 @@
                 <a16:creationId xmlns:a16="http://schemas.microsoft.com/office/drawing/2014/main" id="{504BED40-EAF7-4E55-AFF7-2CD840EBD3AA}"/>
               </a:ext>
               <a:ext uri="{C183D7F6-B498-43B3-948B-1728B52AA6E4}">
-                <adec:decorative xmlns:adec="http://schemas.microsoft.com/office/drawing/2017/decorative" val="1"/>
+                <adec:decorative xmlns:adec="http://schemas.microsoft.com/office/drawing/2017/decorative" xmlns="" val="1"/>
               </a:ext>
             </a:extLst>
           </p:cNvPr>
@@ -8570,7 +8570,7 @@
                 <a16:creationId xmlns:a16="http://schemas.microsoft.com/office/drawing/2014/main" id="{F367CCF1-BB1E-41CF-8499-94A870C33EFA}"/>
               </a:ext>
               <a:ext uri="{C183D7F6-B498-43B3-948B-1728B52AA6E4}">
-                <adec:decorative xmlns:adec="http://schemas.microsoft.com/office/drawing/2017/decorative" val="1"/>
+                <adec:decorative xmlns:adec="http://schemas.microsoft.com/office/drawing/2017/decorative" xmlns="" val="1"/>
               </a:ext>
             </a:extLst>
           </p:cNvPr>
@@ -8850,6 +8850,13 @@
   <p:clrMapOvr>
     <a:masterClrMapping/>
   </p:clrMapOvr>
+  <p:timing>
+    <p:tnLst>
+      <p:par>
+        <p:cTn id="1" dur="indefinite" restart="never" nodeType="tmRoot"/>
+      </p:par>
+    </p:tnLst>
+  </p:timing>
 </p:sld>
 </file>
 
@@ -10766,7 +10773,7 @@
         </p:blipFill>
         <p:spPr>
           <a:xfrm>
-            <a:off x="5962650" y="5130388"/>
+            <a:off x="5814868" y="5423238"/>
             <a:ext cx="5695950" cy="311974"/>
           </a:xfrm>
           <a:prstGeom prst="rect">
@@ -10784,6 +10791,13 @@
   <p:clrMapOvr>
     <a:masterClrMapping/>
   </p:clrMapOvr>
+  <p:timing>
+    <p:tnLst>
+      <p:par>
+        <p:cTn id="1" dur="indefinite" restart="never" nodeType="tmRoot"/>
+      </p:par>
+    </p:tnLst>
+  </p:timing>
 </p:sld>
 </file>
 
@@ -11006,6 +11020,13 @@
   <p:clrMapOvr>
     <a:masterClrMapping/>
   </p:clrMapOvr>
+  <p:timing>
+    <p:tnLst>
+      <p:par>
+        <p:cTn id="1" dur="indefinite" restart="never" nodeType="tmRoot"/>
+      </p:par>
+    </p:tnLst>
+  </p:timing>
 </p:sld>
 </file>
 

</xml_diff>